<commit_message>
Checked Power and Energy for various transitions of interest
</commit_message>
<xml_diff>
--- a/Alternate Charging XSF2.pptx
+++ b/Alternate Charging XSF2.pptx
@@ -5,7 +5,7 @@
     <p:sldMasterId id="2147483648" r:id="rId1"/>
   </p:sldMasterIdLst>
   <p:notesMasterIdLst>
-    <p:notesMasterId r:id="rId26"/>
+    <p:notesMasterId r:id="rId31"/>
   </p:notesMasterIdLst>
   <p:sldIdLst>
     <p:sldId id="256" r:id="rId2"/>
@@ -32,6 +32,11 @@
     <p:sldId id="271" r:id="rId23"/>
     <p:sldId id="281" r:id="rId24"/>
     <p:sldId id="282" r:id="rId25"/>
+    <p:sldId id="283" r:id="rId26"/>
+    <p:sldId id="284" r:id="rId27"/>
+    <p:sldId id="287" r:id="rId28"/>
+    <p:sldId id="285" r:id="rId29"/>
+    <p:sldId id="286" r:id="rId30"/>
   </p:sldIdLst>
   <p:sldSz cx="12192000" cy="6858000"/>
   <p:notesSz cx="6858000" cy="9144000"/>
@@ -220,7 +225,7 @@
           <a:p>
             <a:fld id="{4A198D88-191F-8042-9486-9B1453006BBF}" type="datetimeFigureOut">
               <a:rPr lang="en-US" smtClean="0"/>
-              <a:t>4/26/18</a:t>
+              <a:t>5/2/18</a:t>
             </a:fld>
             <a:endParaRPr lang="en-US"/>
           </a:p>
@@ -619,7 +624,7 @@
           <a:p>
             <a:fld id="{FBAA2CEE-671C-49FB-8187-B6D927D7F5E1}" type="datetimeFigureOut">
               <a:rPr lang="en-US" smtClean="0"/>
-              <a:t>4/26/18</a:t>
+              <a:t>5/2/18</a:t>
             </a:fld>
             <a:endParaRPr lang="en-US"/>
           </a:p>
@@ -789,7 +794,7 @@
           <a:p>
             <a:fld id="{FBAA2CEE-671C-49FB-8187-B6D927D7F5E1}" type="datetimeFigureOut">
               <a:rPr lang="en-US" smtClean="0"/>
-              <a:t>4/26/18</a:t>
+              <a:t>5/2/18</a:t>
             </a:fld>
             <a:endParaRPr lang="en-US"/>
           </a:p>
@@ -969,7 +974,7 @@
           <a:p>
             <a:fld id="{FBAA2CEE-671C-49FB-8187-B6D927D7F5E1}" type="datetimeFigureOut">
               <a:rPr lang="en-US" smtClean="0"/>
-              <a:t>4/26/18</a:t>
+              <a:t>5/2/18</a:t>
             </a:fld>
             <a:endParaRPr lang="en-US"/>
           </a:p>
@@ -1139,7 +1144,7 @@
           <a:p>
             <a:fld id="{FBAA2CEE-671C-49FB-8187-B6D927D7F5E1}" type="datetimeFigureOut">
               <a:rPr lang="en-US" smtClean="0"/>
-              <a:t>4/26/18</a:t>
+              <a:t>5/2/18</a:t>
             </a:fld>
             <a:endParaRPr lang="en-US"/>
           </a:p>
@@ -1385,7 +1390,7 @@
           <a:p>
             <a:fld id="{FBAA2CEE-671C-49FB-8187-B6D927D7F5E1}" type="datetimeFigureOut">
               <a:rPr lang="en-US" smtClean="0"/>
-              <a:t>4/26/18</a:t>
+              <a:t>5/2/18</a:t>
             </a:fld>
             <a:endParaRPr lang="en-US"/>
           </a:p>
@@ -1617,7 +1622,7 @@
           <a:p>
             <a:fld id="{FBAA2CEE-671C-49FB-8187-B6D927D7F5E1}" type="datetimeFigureOut">
               <a:rPr lang="en-US" smtClean="0"/>
-              <a:t>4/26/18</a:t>
+              <a:t>5/2/18</a:t>
             </a:fld>
             <a:endParaRPr lang="en-US"/>
           </a:p>
@@ -1984,7 +1989,7 @@
           <a:p>
             <a:fld id="{FBAA2CEE-671C-49FB-8187-B6D927D7F5E1}" type="datetimeFigureOut">
               <a:rPr lang="en-US" smtClean="0"/>
-              <a:t>4/26/18</a:t>
+              <a:t>5/2/18</a:t>
             </a:fld>
             <a:endParaRPr lang="en-US"/>
           </a:p>
@@ -2102,7 +2107,7 @@
           <a:p>
             <a:fld id="{FBAA2CEE-671C-49FB-8187-B6D927D7F5E1}" type="datetimeFigureOut">
               <a:rPr lang="en-US" smtClean="0"/>
-              <a:t>4/26/18</a:t>
+              <a:t>5/2/18</a:t>
             </a:fld>
             <a:endParaRPr lang="en-US"/>
           </a:p>
@@ -2197,7 +2202,7 @@
           <a:p>
             <a:fld id="{FBAA2CEE-671C-49FB-8187-B6D927D7F5E1}" type="datetimeFigureOut">
               <a:rPr lang="en-US" smtClean="0"/>
-              <a:t>4/26/18</a:t>
+              <a:t>5/2/18</a:t>
             </a:fld>
             <a:endParaRPr lang="en-US"/>
           </a:p>
@@ -2474,7 +2479,7 @@
           <a:p>
             <a:fld id="{FBAA2CEE-671C-49FB-8187-B6D927D7F5E1}" type="datetimeFigureOut">
               <a:rPr lang="en-US" smtClean="0"/>
-              <a:t>4/26/18</a:t>
+              <a:t>5/2/18</a:t>
             </a:fld>
             <a:endParaRPr lang="en-US"/>
           </a:p>
@@ -2727,7 +2732,7 @@
           <a:p>
             <a:fld id="{FBAA2CEE-671C-49FB-8187-B6D927D7F5E1}" type="datetimeFigureOut">
               <a:rPr lang="en-US" smtClean="0"/>
-              <a:t>4/26/18</a:t>
+              <a:t>5/2/18</a:t>
             </a:fld>
             <a:endParaRPr lang="en-US"/>
           </a:p>
@@ -2940,7 +2945,7 @@
           <a:p>
             <a:fld id="{FBAA2CEE-671C-49FB-8187-B6D927D7F5E1}" type="datetimeFigureOut">
               <a:rPr lang="en-US" smtClean="0"/>
-              <a:t>4/26/18</a:t>
+              <a:t>5/2/18</a:t>
             </a:fld>
             <a:endParaRPr lang="en-US"/>
           </a:p>
@@ -3445,11 +3450,7 @@
           <a:p>
             <a:r>
               <a:rPr lang="en-US" dirty="0" smtClean="0"/>
-              <a:t>What about </a:t>
-            </a:r>
-            <a:r>
-              <a:rPr lang="en-US" dirty="0" smtClean="0"/>
-              <a:t>XSF?</a:t>
+              <a:t>What about XSF?</a:t>
             </a:r>
             <a:endParaRPr lang="en-US" dirty="0"/>
           </a:p>
@@ -3579,7 +3580,6 @@
               <a:rPr lang="en-US" sz="2350" dirty="0" smtClean="0"/>
               <a:t>XSF</a:t>
             </a:r>
-            <a:endParaRPr lang="en-US" sz="2350" dirty="0" smtClean="0"/>
           </a:p>
         </p:txBody>
       </p:sp>
@@ -3801,15 +3801,7 @@
           <a:p>
             <a:r>
               <a:rPr lang="en-US" dirty="0" smtClean="0"/>
-              <a:t>What about </a:t>
-            </a:r>
-            <a:r>
-              <a:rPr lang="en-US" dirty="0" smtClean="0"/>
-              <a:t>XSF</a:t>
-            </a:r>
-            <a:r>
-              <a:rPr lang="en-US" dirty="0" smtClean="0"/>
-              <a:t>?</a:t>
+              <a:t>What about XSF?</a:t>
             </a:r>
             <a:endParaRPr lang="en-US" dirty="0"/>
           </a:p>
@@ -3839,15 +3831,7 @@
             <a:pPr lvl="1"/>
             <a:r>
               <a:rPr lang="en-US" dirty="0" smtClean="0"/>
-              <a:t>Low final speed. The </a:t>
-            </a:r>
-            <a:r>
-              <a:rPr lang="en-US" dirty="0" smtClean="0"/>
-              <a:t>XSF </a:t>
-            </a:r>
-            <a:r>
-              <a:rPr lang="en-US" dirty="0" smtClean="0"/>
-              <a:t>effective trap has a higher frequency, and thus requires more frequent focusing events to be realized.</a:t>
+              <a:t>Low final speed. The XSF effective trap has a higher frequency, and thus requires more frequent focusing events to be realized.</a:t>
             </a:r>
           </a:p>
           <a:p>
@@ -4122,15 +4106,7 @@
           <a:p>
             <a:r>
               <a:rPr lang="en-US" dirty="0" smtClean="0"/>
-              <a:t>What about </a:t>
-            </a:r>
-            <a:r>
-              <a:rPr lang="en-US" dirty="0" smtClean="0"/>
-              <a:t>XSF</a:t>
-            </a:r>
-            <a:r>
-              <a:rPr lang="en-US" dirty="0" smtClean="0"/>
-              <a:t>?</a:t>
+              <a:t>What about XSF?</a:t>
             </a:r>
             <a:endParaRPr lang="en-US" dirty="0"/>
           </a:p>
@@ -4160,15 +4136,7 @@
             <a:pPr lvl="1"/>
             <a:r>
               <a:rPr lang="en-US" dirty="0" smtClean="0"/>
-              <a:t>Low final speed. The </a:t>
-            </a:r>
-            <a:r>
-              <a:rPr lang="en-US" dirty="0" smtClean="0"/>
-              <a:t>XSF </a:t>
-            </a:r>
-            <a:r>
-              <a:rPr lang="en-US" dirty="0" smtClean="0"/>
-              <a:t>effective trap has a higher frequency, and thus requires more frequent focusing events to be realized.</a:t>
+              <a:t>Low final speed. The XSF effective trap has a higher frequency, and thus requires more frequent focusing events to be realized.</a:t>
             </a:r>
           </a:p>
           <a:p>
@@ -4195,33 +4163,17 @@
             <a:pPr lvl="1"/>
             <a:r>
               <a:rPr lang="en-US" dirty="0" smtClean="0"/>
-              <a:t>We do need low speeds for trapping, but we should simulate trap-loading to decide, not simply ignore </a:t>
+              <a:t>We do need low speeds for trapping, but we should simulate trap-loading to decide, not simply ignore XSF because the phase space looks ugly.</a:t>
             </a:r>
+          </a:p>
+          <a:p>
+            <a:pPr lvl="1"/>
+            <a:endParaRPr lang="en-US" dirty="0"/>
+          </a:p>
+          <a:p>
             <a:r>
               <a:rPr lang="en-US" dirty="0" smtClean="0"/>
-              <a:t>XSF </a:t>
-            </a:r>
-            <a:r>
-              <a:rPr lang="en-US" dirty="0" smtClean="0"/>
-              <a:t>because the phase space looks ugly.</a:t>
-            </a:r>
-          </a:p>
-          <a:p>
-            <a:pPr lvl="1"/>
-            <a:endParaRPr lang="en-US" dirty="0"/>
-          </a:p>
-          <a:p>
-            <a:r>
-              <a:rPr lang="en-US" dirty="0" smtClean="0"/>
-              <a:t>Also, </a:t>
-            </a:r>
-            <a:r>
-              <a:rPr lang="en-US" dirty="0" smtClean="0"/>
-              <a:t>XSF2</a:t>
-            </a:r>
-            <a:r>
-              <a:rPr lang="en-US" dirty="0" smtClean="0"/>
-              <a:t>:</a:t>
+              <a:t>Also, XSF2:</a:t>
             </a:r>
             <a:endParaRPr lang="en-US" dirty="0"/>
           </a:p>
@@ -4542,15 +4494,7 @@
           <a:p>
             <a:r>
               <a:rPr lang="en-US" dirty="0" smtClean="0"/>
-              <a:t>Unlike VSF2, it actually surpasses </a:t>
-            </a:r>
-            <a:r>
-              <a:rPr lang="en-US" dirty="0" smtClean="0"/>
-              <a:t>XSF </a:t>
-            </a:r>
-            <a:r>
-              <a:rPr lang="en-US" dirty="0" smtClean="0"/>
-              <a:t>slightly:</a:t>
+              <a:t>Unlike VSF2, it actually surpasses XSF slightly:</a:t>
             </a:r>
             <a:endParaRPr lang="en-US" dirty="0"/>
           </a:p>
@@ -4645,7 +4589,6 @@
               <a:rPr lang="en-US" sz="2250" dirty="0" smtClean="0"/>
               <a:t>XSF2</a:t>
             </a:r>
-            <a:endParaRPr lang="en-US" sz="2250" dirty="0" smtClean="0"/>
           </a:p>
         </p:txBody>
       </p:sp>
@@ -4816,15 +4759,7 @@
           <a:p>
             <a:r>
               <a:rPr lang="en-US" dirty="0" smtClean="0"/>
-              <a:t>Unlike VSF2, it actually surpasses </a:t>
-            </a:r>
-            <a:r>
-              <a:rPr lang="en-US" dirty="0" smtClean="0"/>
-              <a:t>XSF </a:t>
-            </a:r>
-            <a:r>
-              <a:rPr lang="en-US" dirty="0" smtClean="0"/>
-              <a:t>slightly:</a:t>
+              <a:t>Unlike VSF2, it actually surpasses XSF slightly:</a:t>
             </a:r>
           </a:p>
           <a:p>
@@ -10965,11 +10900,7 @@
           <a:p>
             <a:r>
               <a:rPr lang="en-US" dirty="0" smtClean="0"/>
-              <a:t>Corroborate with Simulation</a:t>
-            </a:r>
-            <a:r>
-              <a:rPr lang="en-US" dirty="0" smtClean="0"/>
-              <a:t>:</a:t>
+              <a:t>Corroborate with Simulation:</a:t>
             </a:r>
           </a:p>
           <a:p>
@@ -11487,15 +11418,7 @@
             <a:pPr lvl="1"/>
             <a:r>
               <a:rPr lang="en-US" dirty="0" smtClean="0"/>
-              <a:t>Running </a:t>
-            </a:r>
-            <a:r>
-              <a:rPr lang="en-US" dirty="0" smtClean="0"/>
-              <a:t>XSF/XSF2 </a:t>
-            </a:r>
-            <a:r>
-              <a:rPr lang="en-US" dirty="0" smtClean="0"/>
-              <a:t>puts full voltage across adjacent pin pairs.</a:t>
+              <a:t>Running XSF/XSF2 puts full voltage across adjacent pin pairs.</a:t>
             </a:r>
           </a:p>
           <a:p>
@@ -13615,11 +13538,7 @@
           <a:p>
             <a:r>
               <a:rPr lang="en-US" dirty="0" smtClean="0"/>
-              <a:t>Conditioning for </a:t>
-            </a:r>
-            <a:r>
-              <a:rPr lang="en-US" dirty="0" smtClean="0"/>
-              <a:t>XSF2 (+-+-/++--)</a:t>
+              <a:t>Conditioning for XSF2 (+-+-/++--)</a:t>
             </a:r>
             <a:endParaRPr lang="en-US" dirty="0"/>
           </a:p>
@@ -15483,6 +15402,449 @@
 </p:sld>
 </file>
 
+<file path=ppt/slides/slide25.xml><?xml version="1.0" encoding="utf-8"?>
+<p:sld xmlns:a="http://schemas.openxmlformats.org/drawingml/2006/main" xmlns:r="http://schemas.openxmlformats.org/officeDocument/2006/relationships" xmlns:p="http://schemas.openxmlformats.org/presentationml/2006/main">
+  <p:cSld>
+    <p:spTree>
+      <p:nvGrpSpPr>
+        <p:cNvPr id="1" name=""/>
+        <p:cNvGrpSpPr/>
+        <p:nvPr/>
+      </p:nvGrpSpPr>
+      <p:grpSpPr>
+        <a:xfrm>
+          <a:off x="0" y="0"/>
+          <a:ext cx="0" cy="0"/>
+          <a:chOff x="0" y="0"/>
+          <a:chExt cx="0" cy="0"/>
+        </a:xfrm>
+      </p:grpSpPr>
+      <p:sp>
+        <p:nvSpPr>
+          <p:cNvPr id="2" name="Title 1"/>
+          <p:cNvSpPr>
+            <a:spLocks noGrp="1"/>
+          </p:cNvSpPr>
+          <p:nvPr>
+            <p:ph type="title"/>
+          </p:nvPr>
+        </p:nvSpPr>
+        <p:spPr/>
+        <p:txBody>
+          <a:bodyPr/>
+          <a:lstStyle/>
+          <a:p>
+            <a:r>
+              <a:rPr lang="en-US" dirty="0" smtClean="0"/>
+              <a:t>Electronic Requirements</a:t>
+            </a:r>
+            <a:endParaRPr lang="en-US" dirty="0"/>
+          </a:p>
+        </p:txBody>
+      </p:sp>
+      <p:sp>
+        <p:nvSpPr>
+          <p:cNvPr id="3" name="Content Placeholder 2"/>
+          <p:cNvSpPr>
+            <a:spLocks noGrp="1"/>
+          </p:cNvSpPr>
+          <p:nvPr>
+            <p:ph idx="1"/>
+          </p:nvPr>
+        </p:nvSpPr>
+        <p:spPr/>
+        <p:txBody>
+          <a:bodyPr/>
+          <a:lstStyle/>
+          <a:p>
+            <a:r>
+              <a:rPr lang="en-US" dirty="0" smtClean="0"/>
+              <a:t>Next we can check power dissipated in the switches.</a:t>
+            </a:r>
+          </a:p>
+          <a:p>
+            <a:pPr lvl="1"/>
+            <a:r>
+              <a:rPr lang="en-US" dirty="0" smtClean="0"/>
+              <a:t>Assume </a:t>
+            </a:r>
+            <a:r>
+              <a:rPr lang="en-US" dirty="0" err="1" smtClean="0"/>
+              <a:t>R_on</a:t>
+            </a:r>
+            <a:r>
+              <a:rPr lang="en-US" dirty="0" smtClean="0"/>
+              <a:t> = 100 Ohms for now.</a:t>
+            </a:r>
+          </a:p>
+          <a:p>
+            <a:pPr lvl="1"/>
+            <a:r>
+              <a:rPr lang="en-US" dirty="0" smtClean="0"/>
+              <a:t>We can check the instantaneous power</a:t>
+            </a:r>
+          </a:p>
+          <a:p>
+            <a:pPr lvl="1"/>
+            <a:r>
+              <a:rPr lang="en-US" dirty="0" smtClean="0"/>
+              <a:t>Energy per switch</a:t>
+            </a:r>
+          </a:p>
+          <a:p>
+            <a:pPr lvl="1"/>
+            <a:r>
+              <a:rPr lang="en-US" dirty="0" smtClean="0"/>
+              <a:t>Continuous power at 10 Hz</a:t>
+            </a:r>
+            <a:endParaRPr lang="en-US" dirty="0"/>
+          </a:p>
+        </p:txBody>
+      </p:sp>
+    </p:spTree>
+    <p:extLst>
+      <p:ext uri="{BB962C8B-B14F-4D97-AF65-F5344CB8AC3E}">
+        <p14:creationId xmlns:p14="http://schemas.microsoft.com/office/powerpoint/2010/main" val="2130484277"/>
+      </p:ext>
+    </p:extLst>
+  </p:cSld>
+  <p:clrMapOvr>
+    <a:masterClrMapping/>
+  </p:clrMapOvr>
+</p:sld>
+</file>
+
+<file path=ppt/slides/slide26.xml><?xml version="1.0" encoding="utf-8"?>
+<p:sld xmlns:a="http://schemas.openxmlformats.org/drawingml/2006/main" xmlns:r="http://schemas.openxmlformats.org/officeDocument/2006/relationships" xmlns:p="http://schemas.openxmlformats.org/presentationml/2006/main">
+  <p:cSld>
+    <p:spTree>
+      <p:nvGrpSpPr>
+        <p:cNvPr id="1" name=""/>
+        <p:cNvGrpSpPr/>
+        <p:nvPr/>
+      </p:nvGrpSpPr>
+      <p:grpSpPr>
+        <a:xfrm>
+          <a:off x="0" y="0"/>
+          <a:ext cx="0" cy="0"/>
+          <a:chOff x="0" y="0"/>
+          <a:chExt cx="0" cy="0"/>
+        </a:xfrm>
+      </p:grpSpPr>
+      <p:sp>
+        <p:nvSpPr>
+          <p:cNvPr id="2" name="Title 1"/>
+          <p:cNvSpPr>
+            <a:spLocks noGrp="1"/>
+          </p:cNvSpPr>
+          <p:nvPr>
+            <p:ph type="title"/>
+          </p:nvPr>
+        </p:nvSpPr>
+        <p:spPr/>
+        <p:txBody>
+          <a:bodyPr/>
+          <a:lstStyle/>
+          <a:p>
+            <a:r>
+              <a:rPr lang="en-US" dirty="0" smtClean="0"/>
+              <a:t>Electronic Requirements</a:t>
+            </a:r>
+            <a:endParaRPr lang="en-US" dirty="0"/>
+          </a:p>
+        </p:txBody>
+      </p:sp>
+      <p:pic>
+        <p:nvPicPr>
+          <p:cNvPr id="4" name="Content Placeholder 3"/>
+          <p:cNvPicPr>
+            <a:picLocks noGrp="1" noChangeAspect="1"/>
+          </p:cNvPicPr>
+          <p:nvPr>
+            <p:ph idx="1"/>
+          </p:nvPr>
+        </p:nvPicPr>
+        <p:blipFill>
+          <a:blip r:embed="rId2">
+            <a:extLst>
+              <a:ext uri="{28A0092B-C50C-407E-A947-70E740481C1C}">
+                <a14:useLocalDpi xmlns:a14="http://schemas.microsoft.com/office/drawing/2010/main" val="0"/>
+              </a:ext>
+            </a:extLst>
+          </a:blip>
+          <a:stretch>
+            <a:fillRect/>
+          </a:stretch>
+        </p:blipFill>
+        <p:spPr>
+          <a:xfrm>
+            <a:off x="0" y="1524000"/>
+            <a:ext cx="7112000" cy="5334000"/>
+          </a:xfrm>
+        </p:spPr>
+      </p:pic>
+    </p:spTree>
+    <p:extLst>
+      <p:ext uri="{BB962C8B-B14F-4D97-AF65-F5344CB8AC3E}">
+        <p14:creationId xmlns:p14="http://schemas.microsoft.com/office/powerpoint/2010/main" val="980709050"/>
+      </p:ext>
+    </p:extLst>
+  </p:cSld>
+  <p:clrMapOvr>
+    <a:masterClrMapping/>
+  </p:clrMapOvr>
+</p:sld>
+</file>
+
+<file path=ppt/slides/slide27.xml><?xml version="1.0" encoding="utf-8"?>
+<p:sld xmlns:a="http://schemas.openxmlformats.org/drawingml/2006/main" xmlns:r="http://schemas.openxmlformats.org/officeDocument/2006/relationships" xmlns:p="http://schemas.openxmlformats.org/presentationml/2006/main">
+  <p:cSld>
+    <p:spTree>
+      <p:nvGrpSpPr>
+        <p:cNvPr id="1" name=""/>
+        <p:cNvGrpSpPr/>
+        <p:nvPr/>
+      </p:nvGrpSpPr>
+      <p:grpSpPr>
+        <a:xfrm>
+          <a:off x="0" y="0"/>
+          <a:ext cx="0" cy="0"/>
+          <a:chOff x="0" y="0"/>
+          <a:chExt cx="0" cy="0"/>
+        </a:xfrm>
+      </p:grpSpPr>
+      <p:sp>
+        <p:nvSpPr>
+          <p:cNvPr id="2" name="Title 1"/>
+          <p:cNvSpPr>
+            <a:spLocks noGrp="1"/>
+          </p:cNvSpPr>
+          <p:nvPr>
+            <p:ph type="title"/>
+          </p:nvPr>
+        </p:nvSpPr>
+        <p:spPr/>
+        <p:txBody>
+          <a:bodyPr/>
+          <a:lstStyle/>
+          <a:p>
+            <a:r>
+              <a:rPr lang="en-US" dirty="0" smtClean="0"/>
+              <a:t>Electronic Requirements</a:t>
+            </a:r>
+            <a:endParaRPr lang="en-US" dirty="0"/>
+          </a:p>
+        </p:txBody>
+      </p:sp>
+      <p:pic>
+        <p:nvPicPr>
+          <p:cNvPr id="6" name="Picture 5"/>
+          <p:cNvPicPr>
+            <a:picLocks noChangeAspect="1"/>
+          </p:cNvPicPr>
+          <p:nvPr/>
+        </p:nvPicPr>
+        <p:blipFill>
+          <a:blip r:embed="rId2">
+            <a:extLst>
+              <a:ext uri="{28A0092B-C50C-407E-A947-70E740481C1C}">
+                <a14:useLocalDpi xmlns:a14="http://schemas.microsoft.com/office/drawing/2010/main" val="0"/>
+              </a:ext>
+            </a:extLst>
+          </a:blip>
+          <a:stretch>
+            <a:fillRect/>
+          </a:stretch>
+        </p:blipFill>
+        <p:spPr>
+          <a:xfrm>
+            <a:off x="0" y="1524000"/>
+            <a:ext cx="7112000" cy="5334000"/>
+          </a:xfrm>
+          <a:prstGeom prst="rect">
+            <a:avLst/>
+          </a:prstGeom>
+        </p:spPr>
+      </p:pic>
+    </p:spTree>
+    <p:extLst>
+      <p:ext uri="{BB962C8B-B14F-4D97-AF65-F5344CB8AC3E}">
+        <p14:creationId xmlns:p14="http://schemas.microsoft.com/office/powerpoint/2010/main" val="110157443"/>
+      </p:ext>
+    </p:extLst>
+  </p:cSld>
+  <p:clrMapOvr>
+    <a:masterClrMapping/>
+  </p:clrMapOvr>
+</p:sld>
+</file>
+
+<file path=ppt/slides/slide28.xml><?xml version="1.0" encoding="utf-8"?>
+<p:sld xmlns:a="http://schemas.openxmlformats.org/drawingml/2006/main" xmlns:r="http://schemas.openxmlformats.org/officeDocument/2006/relationships" xmlns:p="http://schemas.openxmlformats.org/presentationml/2006/main">
+  <p:cSld>
+    <p:spTree>
+      <p:nvGrpSpPr>
+        <p:cNvPr id="1" name=""/>
+        <p:cNvGrpSpPr/>
+        <p:nvPr/>
+      </p:nvGrpSpPr>
+      <p:grpSpPr>
+        <a:xfrm>
+          <a:off x="0" y="0"/>
+          <a:ext cx="0" cy="0"/>
+          <a:chOff x="0" y="0"/>
+          <a:chExt cx="0" cy="0"/>
+        </a:xfrm>
+      </p:grpSpPr>
+      <p:sp>
+        <p:nvSpPr>
+          <p:cNvPr id="2" name="Title 1"/>
+          <p:cNvSpPr>
+            <a:spLocks noGrp="1"/>
+          </p:cNvSpPr>
+          <p:nvPr>
+            <p:ph type="title"/>
+          </p:nvPr>
+        </p:nvSpPr>
+        <p:spPr/>
+        <p:txBody>
+          <a:bodyPr/>
+          <a:lstStyle/>
+          <a:p>
+            <a:r>
+              <a:rPr lang="en-US" dirty="0" smtClean="0"/>
+              <a:t>Electronic Requirements</a:t>
+            </a:r>
+            <a:endParaRPr lang="en-US" dirty="0"/>
+          </a:p>
+        </p:txBody>
+      </p:sp>
+      <p:pic>
+        <p:nvPicPr>
+          <p:cNvPr id="7" name="Picture 6"/>
+          <p:cNvPicPr>
+            <a:picLocks noChangeAspect="1"/>
+          </p:cNvPicPr>
+          <p:nvPr/>
+        </p:nvPicPr>
+        <p:blipFill>
+          <a:blip r:embed="rId2">
+            <a:extLst>
+              <a:ext uri="{28A0092B-C50C-407E-A947-70E740481C1C}">
+                <a14:useLocalDpi xmlns:a14="http://schemas.microsoft.com/office/drawing/2010/main" val="0"/>
+              </a:ext>
+            </a:extLst>
+          </a:blip>
+          <a:stretch>
+            <a:fillRect/>
+          </a:stretch>
+        </p:blipFill>
+        <p:spPr>
+          <a:xfrm>
+            <a:off x="0" y="1524000"/>
+            <a:ext cx="7112000" cy="5334000"/>
+          </a:xfrm>
+          <a:prstGeom prst="rect">
+            <a:avLst/>
+          </a:prstGeom>
+        </p:spPr>
+      </p:pic>
+    </p:spTree>
+    <p:extLst>
+      <p:ext uri="{BB962C8B-B14F-4D97-AF65-F5344CB8AC3E}">
+        <p14:creationId xmlns:p14="http://schemas.microsoft.com/office/powerpoint/2010/main" val="629418032"/>
+      </p:ext>
+    </p:extLst>
+  </p:cSld>
+  <p:clrMapOvr>
+    <a:masterClrMapping/>
+  </p:clrMapOvr>
+</p:sld>
+</file>
+
+<file path=ppt/slides/slide29.xml><?xml version="1.0" encoding="utf-8"?>
+<p:sld xmlns:a="http://schemas.openxmlformats.org/drawingml/2006/main" xmlns:r="http://schemas.openxmlformats.org/officeDocument/2006/relationships" xmlns:p="http://schemas.openxmlformats.org/presentationml/2006/main">
+  <p:cSld>
+    <p:spTree>
+      <p:nvGrpSpPr>
+        <p:cNvPr id="1" name=""/>
+        <p:cNvGrpSpPr/>
+        <p:nvPr/>
+      </p:nvGrpSpPr>
+      <p:grpSpPr>
+        <a:xfrm>
+          <a:off x="0" y="0"/>
+          <a:ext cx="0" cy="0"/>
+          <a:chOff x="0" y="0"/>
+          <a:chExt cx="0" cy="0"/>
+        </a:xfrm>
+      </p:grpSpPr>
+      <p:sp>
+        <p:nvSpPr>
+          <p:cNvPr id="2" name="Title 1"/>
+          <p:cNvSpPr>
+            <a:spLocks noGrp="1"/>
+          </p:cNvSpPr>
+          <p:nvPr>
+            <p:ph type="title"/>
+          </p:nvPr>
+        </p:nvSpPr>
+        <p:spPr/>
+        <p:txBody>
+          <a:bodyPr/>
+          <a:lstStyle/>
+          <a:p>
+            <a:r>
+              <a:rPr lang="en-US" dirty="0" smtClean="0"/>
+              <a:t>Electronic Requirements</a:t>
+            </a:r>
+            <a:endParaRPr lang="en-US" dirty="0"/>
+          </a:p>
+        </p:txBody>
+      </p:sp>
+      <p:pic>
+        <p:nvPicPr>
+          <p:cNvPr id="5" name="Picture 4"/>
+          <p:cNvPicPr>
+            <a:picLocks noChangeAspect="1"/>
+          </p:cNvPicPr>
+          <p:nvPr/>
+        </p:nvPicPr>
+        <p:blipFill>
+          <a:blip r:embed="rId2">
+            <a:extLst>
+              <a:ext uri="{28A0092B-C50C-407E-A947-70E740481C1C}">
+                <a14:useLocalDpi xmlns:a14="http://schemas.microsoft.com/office/drawing/2010/main" val="0"/>
+              </a:ext>
+            </a:extLst>
+          </a:blip>
+          <a:stretch>
+            <a:fillRect/>
+          </a:stretch>
+        </p:blipFill>
+        <p:spPr>
+          <a:xfrm>
+            <a:off x="0" y="1524000"/>
+            <a:ext cx="7112000" cy="5334000"/>
+          </a:xfrm>
+          <a:prstGeom prst="rect">
+            <a:avLst/>
+          </a:prstGeom>
+        </p:spPr>
+      </p:pic>
+    </p:spTree>
+    <p:extLst>
+      <p:ext uri="{BB962C8B-B14F-4D97-AF65-F5344CB8AC3E}">
+        <p14:creationId xmlns:p14="http://schemas.microsoft.com/office/powerpoint/2010/main" val="1946379854"/>
+      </p:ext>
+    </p:extLst>
+  </p:cSld>
+  <p:clrMapOvr>
+    <a:masterClrMapping/>
+  </p:clrMapOvr>
+</p:sld>
+</file>
+
 <file path=ppt/slides/slide3.xml><?xml version="1.0" encoding="utf-8"?>
 <p:sld xmlns:a="http://schemas.openxmlformats.org/drawingml/2006/main" xmlns:r="http://schemas.openxmlformats.org/officeDocument/2006/relationships" xmlns:p="http://schemas.openxmlformats.org/presentationml/2006/main">
   <p:cSld>
@@ -16863,15 +17225,7 @@
           <a:p>
             <a:r>
               <a:rPr lang="en-US" dirty="0" smtClean="0"/>
-              <a:t>What about </a:t>
-            </a:r>
-            <a:r>
-              <a:rPr lang="en-US" dirty="0" smtClean="0"/>
-              <a:t>XSF</a:t>
-            </a:r>
-            <a:r>
-              <a:rPr lang="en-US" dirty="0" smtClean="0"/>
-              <a:t>?</a:t>
+              <a:t>What about XSF?</a:t>
             </a:r>
             <a:endParaRPr lang="en-US" dirty="0"/>
           </a:p>

</xml_diff>

<commit_message>
Significant Contributions to Intro
</commit_message>
<xml_diff>
--- a/Alternate Charging XSF2.pptx
+++ b/Alternate Charging XSF2.pptx
@@ -232,7 +232,7 @@
           <a:p>
             <a:fld id="{4A198D88-191F-8042-9486-9B1453006BBF}" type="datetimeFigureOut">
               <a:rPr lang="en-US" smtClean="0"/>
-              <a:t>5/2/18</a:t>
+              <a:t>9/7/2018</a:t>
             </a:fld>
             <a:endParaRPr lang="en-US"/>
           </a:p>
@@ -631,7 +631,7 @@
           <a:p>
             <a:fld id="{FBAA2CEE-671C-49FB-8187-B6D927D7F5E1}" type="datetimeFigureOut">
               <a:rPr lang="en-US" smtClean="0"/>
-              <a:t>5/2/18</a:t>
+              <a:t>9/7/2018</a:t>
             </a:fld>
             <a:endParaRPr lang="en-US"/>
           </a:p>
@@ -801,7 +801,7 @@
           <a:p>
             <a:fld id="{FBAA2CEE-671C-49FB-8187-B6D927D7F5E1}" type="datetimeFigureOut">
               <a:rPr lang="en-US" smtClean="0"/>
-              <a:t>5/2/18</a:t>
+              <a:t>9/7/2018</a:t>
             </a:fld>
             <a:endParaRPr lang="en-US"/>
           </a:p>
@@ -981,7 +981,7 @@
           <a:p>
             <a:fld id="{FBAA2CEE-671C-49FB-8187-B6D927D7F5E1}" type="datetimeFigureOut">
               <a:rPr lang="en-US" smtClean="0"/>
-              <a:t>5/2/18</a:t>
+              <a:t>9/7/2018</a:t>
             </a:fld>
             <a:endParaRPr lang="en-US"/>
           </a:p>
@@ -1151,7 +1151,7 @@
           <a:p>
             <a:fld id="{FBAA2CEE-671C-49FB-8187-B6D927D7F5E1}" type="datetimeFigureOut">
               <a:rPr lang="en-US" smtClean="0"/>
-              <a:t>5/2/18</a:t>
+              <a:t>9/7/2018</a:t>
             </a:fld>
             <a:endParaRPr lang="en-US"/>
           </a:p>
@@ -1397,7 +1397,7 @@
           <a:p>
             <a:fld id="{FBAA2CEE-671C-49FB-8187-B6D927D7F5E1}" type="datetimeFigureOut">
               <a:rPr lang="en-US" smtClean="0"/>
-              <a:t>5/2/18</a:t>
+              <a:t>9/7/2018</a:t>
             </a:fld>
             <a:endParaRPr lang="en-US"/>
           </a:p>
@@ -1629,7 +1629,7 @@
           <a:p>
             <a:fld id="{FBAA2CEE-671C-49FB-8187-B6D927D7F5E1}" type="datetimeFigureOut">
               <a:rPr lang="en-US" smtClean="0"/>
-              <a:t>5/2/18</a:t>
+              <a:t>9/7/2018</a:t>
             </a:fld>
             <a:endParaRPr lang="en-US"/>
           </a:p>
@@ -1996,7 +1996,7 @@
           <a:p>
             <a:fld id="{FBAA2CEE-671C-49FB-8187-B6D927D7F5E1}" type="datetimeFigureOut">
               <a:rPr lang="en-US" smtClean="0"/>
-              <a:t>5/2/18</a:t>
+              <a:t>9/7/2018</a:t>
             </a:fld>
             <a:endParaRPr lang="en-US"/>
           </a:p>
@@ -2114,7 +2114,7 @@
           <a:p>
             <a:fld id="{FBAA2CEE-671C-49FB-8187-B6D927D7F5E1}" type="datetimeFigureOut">
               <a:rPr lang="en-US" smtClean="0"/>
-              <a:t>5/2/18</a:t>
+              <a:t>9/7/2018</a:t>
             </a:fld>
             <a:endParaRPr lang="en-US"/>
           </a:p>
@@ -2209,7 +2209,7 @@
           <a:p>
             <a:fld id="{FBAA2CEE-671C-49FB-8187-B6D927D7F5E1}" type="datetimeFigureOut">
               <a:rPr lang="en-US" smtClean="0"/>
-              <a:t>5/2/18</a:t>
+              <a:t>9/7/2018</a:t>
             </a:fld>
             <a:endParaRPr lang="en-US"/>
           </a:p>
@@ -2486,7 +2486,7 @@
           <a:p>
             <a:fld id="{FBAA2CEE-671C-49FB-8187-B6D927D7F5E1}" type="datetimeFigureOut">
               <a:rPr lang="en-US" smtClean="0"/>
-              <a:t>5/2/18</a:t>
+              <a:t>9/7/2018</a:t>
             </a:fld>
             <a:endParaRPr lang="en-US"/>
           </a:p>
@@ -2739,7 +2739,7 @@
           <a:p>
             <a:fld id="{FBAA2CEE-671C-49FB-8187-B6D927D7F5E1}" type="datetimeFigureOut">
               <a:rPr lang="en-US" smtClean="0"/>
-              <a:t>5/2/18</a:t>
+              <a:t>9/7/2018</a:t>
             </a:fld>
             <a:endParaRPr lang="en-US"/>
           </a:p>
@@ -2952,7 +2952,7 @@
           <a:p>
             <a:fld id="{FBAA2CEE-671C-49FB-8187-B6D927D7F5E1}" type="datetimeFigureOut">
               <a:rPr lang="en-US" smtClean="0"/>
-              <a:t>5/2/18</a:t>
+              <a:t>9/7/2018</a:t>
             </a:fld>
             <a:endParaRPr lang="en-US"/>
           </a:p>
@@ -10620,8 +10620,20 @@
                 <a:tableStyleId>{5C22544A-7EE6-4342-B048-85BDC9FD1C3A}</a:tableStyleId>
               </a:tblPr>
               <a:tblGrid>
-                <a:gridCol w="647330"/>
-                <a:gridCol w="1286934"/>
+                <a:gridCol w="647330">
+                  <a:extLst>
+                    <a:ext uri="{9D8B030D-6E8A-4147-A177-3AD203B41FA5}">
+                      <a16:colId xmlns:a16="http://schemas.microsoft.com/office/drawing/2014/main" val="20000"/>
+                    </a:ext>
+                  </a:extLst>
+                </a:gridCol>
+                <a:gridCol w="1286934">
+                  <a:extLst>
+                    <a:ext uri="{9D8B030D-6E8A-4147-A177-3AD203B41FA5}">
+                      <a16:colId xmlns:a16="http://schemas.microsoft.com/office/drawing/2014/main" val="20001"/>
+                    </a:ext>
+                  </a:extLst>
+                </a:gridCol>
               </a:tblGrid>
               <a:tr h="682465">
                 <a:tc>
@@ -10652,6 +10664,11 @@
                   </a:txBody>
                   <a:tcPr/>
                 </a:tc>
+                <a:extLst>
+                  <a:ext uri="{0D108BD9-81ED-4DB2-BD59-A6C34878D82A}">
+                    <a16:rowId xmlns:a16="http://schemas.microsoft.com/office/drawing/2014/main" val="10000"/>
+                  </a:ext>
+                </a:extLst>
               </a:tr>
               <a:tr h="682465">
                 <a:tc>
@@ -10682,6 +10699,11 @@
                   </a:txBody>
                   <a:tcPr/>
                 </a:tc>
+                <a:extLst>
+                  <a:ext uri="{0D108BD9-81ED-4DB2-BD59-A6C34878D82A}">
+                    <a16:rowId xmlns:a16="http://schemas.microsoft.com/office/drawing/2014/main" val="10001"/>
+                  </a:ext>
+                </a:extLst>
               </a:tr>
               <a:tr h="682465">
                 <a:tc>
@@ -10712,6 +10734,11 @@
                   </a:txBody>
                   <a:tcPr/>
                 </a:tc>
+                <a:extLst>
+                  <a:ext uri="{0D108BD9-81ED-4DB2-BD59-A6C34878D82A}">
+                    <a16:rowId xmlns:a16="http://schemas.microsoft.com/office/drawing/2014/main" val="10002"/>
+                  </a:ext>
+                </a:extLst>
               </a:tr>
             </a:tbl>
           </a:graphicData>
@@ -14109,7 +14136,7 @@
           <p:nvPr>
             <p:extLst>
               <p:ext uri="{D42A27DB-BD31-4B8C-83A1-F6EECF244321}">
-                <p14:modId xmlns:p14="http://schemas.microsoft.com/office/powerpoint/2010/main" val="2097543606"/>
+                <p14:modId xmlns:p14="http://schemas.microsoft.com/office/powerpoint/2010/main" val="4038298773"/>
               </p:ext>
             </p:extLst>
           </p:nvPr>
@@ -14125,12 +14152,48 @@
                 <a:tableStyleId>{5C22544A-7EE6-4342-B048-85BDC9FD1C3A}</a:tableStyleId>
               </a:tblPr>
               <a:tblGrid>
-                <a:gridCol w="900289"/>
-                <a:gridCol w="900289"/>
-                <a:gridCol w="900289"/>
-                <a:gridCol w="900289"/>
-                <a:gridCol w="900289"/>
-                <a:gridCol w="900289"/>
+                <a:gridCol w="900289">
+                  <a:extLst>
+                    <a:ext uri="{9D8B030D-6E8A-4147-A177-3AD203B41FA5}">
+                      <a16:colId xmlns:a16="http://schemas.microsoft.com/office/drawing/2014/main" val="20000"/>
+                    </a:ext>
+                  </a:extLst>
+                </a:gridCol>
+                <a:gridCol w="900289">
+                  <a:extLst>
+                    <a:ext uri="{9D8B030D-6E8A-4147-A177-3AD203B41FA5}">
+                      <a16:colId xmlns:a16="http://schemas.microsoft.com/office/drawing/2014/main" val="20001"/>
+                    </a:ext>
+                  </a:extLst>
+                </a:gridCol>
+                <a:gridCol w="900289">
+                  <a:extLst>
+                    <a:ext uri="{9D8B030D-6E8A-4147-A177-3AD203B41FA5}">
+                      <a16:colId xmlns:a16="http://schemas.microsoft.com/office/drawing/2014/main" val="20002"/>
+                    </a:ext>
+                  </a:extLst>
+                </a:gridCol>
+                <a:gridCol w="900289">
+                  <a:extLst>
+                    <a:ext uri="{9D8B030D-6E8A-4147-A177-3AD203B41FA5}">
+                      <a16:colId xmlns:a16="http://schemas.microsoft.com/office/drawing/2014/main" val="20003"/>
+                    </a:ext>
+                  </a:extLst>
+                </a:gridCol>
+                <a:gridCol w="900289">
+                  <a:extLst>
+                    <a:ext uri="{9D8B030D-6E8A-4147-A177-3AD203B41FA5}">
+                      <a16:colId xmlns:a16="http://schemas.microsoft.com/office/drawing/2014/main" val="20004"/>
+                    </a:ext>
+                  </a:extLst>
+                </a:gridCol>
+                <a:gridCol w="900289">
+                  <a:extLst>
+                    <a:ext uri="{9D8B030D-6E8A-4147-A177-3AD203B41FA5}">
+                      <a16:colId xmlns:a16="http://schemas.microsoft.com/office/drawing/2014/main" val="20005"/>
+                    </a:ext>
+                  </a:extLst>
+                </a:gridCol>
               </a:tblGrid>
               <a:tr h="597605">
                 <a:tc>
@@ -14217,6 +14280,11 @@
                   </a:txBody>
                   <a:tcPr/>
                 </a:tc>
+                <a:extLst>
+                  <a:ext uri="{0D108BD9-81ED-4DB2-BD59-A6C34878D82A}">
+                    <a16:rowId xmlns:a16="http://schemas.microsoft.com/office/drawing/2014/main" val="10000"/>
+                  </a:ext>
+                </a:extLst>
               </a:tr>
               <a:tr h="597605">
                 <a:tc>
@@ -14324,6 +14392,11 @@
                   </a:txBody>
                   <a:tcPr/>
                 </a:tc>
+                <a:extLst>
+                  <a:ext uri="{0D108BD9-81ED-4DB2-BD59-A6C34878D82A}">
+                    <a16:rowId xmlns:a16="http://schemas.microsoft.com/office/drawing/2014/main" val="10001"/>
+                  </a:ext>
+                </a:extLst>
               </a:tr>
               <a:tr h="597605">
                 <a:tc>
@@ -14410,6 +14483,11 @@
                   </a:txBody>
                   <a:tcPr/>
                 </a:tc>
+                <a:extLst>
+                  <a:ext uri="{0D108BD9-81ED-4DB2-BD59-A6C34878D82A}">
+                    <a16:rowId xmlns:a16="http://schemas.microsoft.com/office/drawing/2014/main" val="10002"/>
+                  </a:ext>
+                </a:extLst>
               </a:tr>
               <a:tr h="597605">
                 <a:tc>
@@ -14433,7 +14511,7 @@
                     <a:p>
                       <a:r>
                         <a:rPr lang="en-US" sz="2400" dirty="0" smtClean="0"/>
-                        <a:t>64.5</a:t>
+                        <a:t>-64.5</a:t>
                       </a:r>
                       <a:endParaRPr lang="en-US" sz="2400" dirty="0"/>
                     </a:p>
@@ -14496,6 +14574,11 @@
                   </a:txBody>
                   <a:tcPr/>
                 </a:tc>
+                <a:extLst>
+                  <a:ext uri="{0D108BD9-81ED-4DB2-BD59-A6C34878D82A}">
+                    <a16:rowId xmlns:a16="http://schemas.microsoft.com/office/drawing/2014/main" val="10003"/>
+                  </a:ext>
+                </a:extLst>
               </a:tr>
               <a:tr h="597605">
                 <a:tc>
@@ -14582,6 +14665,11 @@
                   </a:txBody>
                   <a:tcPr/>
                 </a:tc>
+                <a:extLst>
+                  <a:ext uri="{0D108BD9-81ED-4DB2-BD59-A6C34878D82A}">
+                    <a16:rowId xmlns:a16="http://schemas.microsoft.com/office/drawing/2014/main" val="10004"/>
+                  </a:ext>
+                </a:extLst>
               </a:tr>
               <a:tr h="597605">
                 <a:tc>
@@ -14668,6 +14756,11 @@
                   </a:txBody>
                   <a:tcPr/>
                 </a:tc>
+                <a:extLst>
+                  <a:ext uri="{0D108BD9-81ED-4DB2-BD59-A6C34878D82A}">
+                    <a16:rowId xmlns:a16="http://schemas.microsoft.com/office/drawing/2014/main" val="10005"/>
+                  </a:ext>
+                </a:extLst>
               </a:tr>
             </a:tbl>
           </a:graphicData>
@@ -14698,12 +14791,48 @@
                 <a:tableStyleId>{5C22544A-7EE6-4342-B048-85BDC9FD1C3A}</a:tableStyleId>
               </a:tblPr>
               <a:tblGrid>
-                <a:gridCol w="900289"/>
-                <a:gridCol w="900289"/>
-                <a:gridCol w="900289"/>
-                <a:gridCol w="900289"/>
-                <a:gridCol w="900289"/>
-                <a:gridCol w="900289"/>
+                <a:gridCol w="900289">
+                  <a:extLst>
+                    <a:ext uri="{9D8B030D-6E8A-4147-A177-3AD203B41FA5}">
+                      <a16:colId xmlns:a16="http://schemas.microsoft.com/office/drawing/2014/main" val="20000"/>
+                    </a:ext>
+                  </a:extLst>
+                </a:gridCol>
+                <a:gridCol w="900289">
+                  <a:extLst>
+                    <a:ext uri="{9D8B030D-6E8A-4147-A177-3AD203B41FA5}">
+                      <a16:colId xmlns:a16="http://schemas.microsoft.com/office/drawing/2014/main" val="20001"/>
+                    </a:ext>
+                  </a:extLst>
+                </a:gridCol>
+                <a:gridCol w="900289">
+                  <a:extLst>
+                    <a:ext uri="{9D8B030D-6E8A-4147-A177-3AD203B41FA5}">
+                      <a16:colId xmlns:a16="http://schemas.microsoft.com/office/drawing/2014/main" val="20002"/>
+                    </a:ext>
+                  </a:extLst>
+                </a:gridCol>
+                <a:gridCol w="900289">
+                  <a:extLst>
+                    <a:ext uri="{9D8B030D-6E8A-4147-A177-3AD203B41FA5}">
+                      <a16:colId xmlns:a16="http://schemas.microsoft.com/office/drawing/2014/main" val="20003"/>
+                    </a:ext>
+                  </a:extLst>
+                </a:gridCol>
+                <a:gridCol w="900289">
+                  <a:extLst>
+                    <a:ext uri="{9D8B030D-6E8A-4147-A177-3AD203B41FA5}">
+                      <a16:colId xmlns:a16="http://schemas.microsoft.com/office/drawing/2014/main" val="20004"/>
+                    </a:ext>
+                  </a:extLst>
+                </a:gridCol>
+                <a:gridCol w="900289">
+                  <a:extLst>
+                    <a:ext uri="{9D8B030D-6E8A-4147-A177-3AD203B41FA5}">
+                      <a16:colId xmlns:a16="http://schemas.microsoft.com/office/drawing/2014/main" val="20005"/>
+                    </a:ext>
+                  </a:extLst>
+                </a:gridCol>
               </a:tblGrid>
               <a:tr h="597605">
                 <a:tc>
@@ -14790,6 +14919,11 @@
                   </a:txBody>
                   <a:tcPr/>
                 </a:tc>
+                <a:extLst>
+                  <a:ext uri="{0D108BD9-81ED-4DB2-BD59-A6C34878D82A}">
+                    <a16:rowId xmlns:a16="http://schemas.microsoft.com/office/drawing/2014/main" val="10000"/>
+                  </a:ext>
+                </a:extLst>
               </a:tr>
               <a:tr h="597605">
                 <a:tc>
@@ -14897,6 +15031,11 @@
                   </a:txBody>
                   <a:tcPr/>
                 </a:tc>
+                <a:extLst>
+                  <a:ext uri="{0D108BD9-81ED-4DB2-BD59-A6C34878D82A}">
+                    <a16:rowId xmlns:a16="http://schemas.microsoft.com/office/drawing/2014/main" val="10001"/>
+                  </a:ext>
+                </a:extLst>
               </a:tr>
               <a:tr h="597605">
                 <a:tc>
@@ -14983,6 +15122,11 @@
                   </a:txBody>
                   <a:tcPr/>
                 </a:tc>
+                <a:extLst>
+                  <a:ext uri="{0D108BD9-81ED-4DB2-BD59-A6C34878D82A}">
+                    <a16:rowId xmlns:a16="http://schemas.microsoft.com/office/drawing/2014/main" val="10002"/>
+                  </a:ext>
+                </a:extLst>
               </a:tr>
               <a:tr h="597605">
                 <a:tc>
@@ -15069,6 +15213,11 @@
                   </a:txBody>
                   <a:tcPr/>
                 </a:tc>
+                <a:extLst>
+                  <a:ext uri="{0D108BD9-81ED-4DB2-BD59-A6C34878D82A}">
+                    <a16:rowId xmlns:a16="http://schemas.microsoft.com/office/drawing/2014/main" val="10003"/>
+                  </a:ext>
+                </a:extLst>
               </a:tr>
               <a:tr h="597605">
                 <a:tc>
@@ -15155,6 +15304,11 @@
                   </a:txBody>
                   <a:tcPr/>
                 </a:tc>
+                <a:extLst>
+                  <a:ext uri="{0D108BD9-81ED-4DB2-BD59-A6C34878D82A}">
+                    <a16:rowId xmlns:a16="http://schemas.microsoft.com/office/drawing/2014/main" val="10004"/>
+                  </a:ext>
+                </a:extLst>
               </a:tr>
               <a:tr h="597605">
                 <a:tc>
@@ -15241,6 +15395,11 @@
                   </a:txBody>
                   <a:tcPr/>
                 </a:tc>
+                <a:extLst>
+                  <a:ext uri="{0D108BD9-81ED-4DB2-BD59-A6C34878D82A}">
+                    <a16:rowId xmlns:a16="http://schemas.microsoft.com/office/drawing/2014/main" val="10005"/>
+                  </a:ext>
+                </a:extLst>
               </a:tr>
             </a:tbl>
           </a:graphicData>
@@ -15690,9 +15849,27 @@
                 <a:tableStyleId>{5C22544A-7EE6-4342-B048-85BDC9FD1C3A}</a:tableStyleId>
               </a:tblPr>
               <a:tblGrid>
-                <a:gridCol w="974621"/>
-                <a:gridCol w="1091245"/>
-                <a:gridCol w="1397955"/>
+                <a:gridCol w="974621">
+                  <a:extLst>
+                    <a:ext uri="{9D8B030D-6E8A-4147-A177-3AD203B41FA5}">
+                      <a16:colId xmlns:a16="http://schemas.microsoft.com/office/drawing/2014/main" val="20000"/>
+                    </a:ext>
+                  </a:extLst>
+                </a:gridCol>
+                <a:gridCol w="1091245">
+                  <a:extLst>
+                    <a:ext uri="{9D8B030D-6E8A-4147-A177-3AD203B41FA5}">
+                      <a16:colId xmlns:a16="http://schemas.microsoft.com/office/drawing/2014/main" val="20001"/>
+                    </a:ext>
+                  </a:extLst>
+                </a:gridCol>
+                <a:gridCol w="1397955">
+                  <a:extLst>
+                    <a:ext uri="{9D8B030D-6E8A-4147-A177-3AD203B41FA5}">
+                      <a16:colId xmlns:a16="http://schemas.microsoft.com/office/drawing/2014/main" val="20002"/>
+                    </a:ext>
+                  </a:extLst>
+                </a:gridCol>
               </a:tblGrid>
               <a:tr h="562707">
                 <a:tc>
@@ -15752,6 +15929,11 @@
                   </a:txBody>
                   <a:tcPr/>
                 </a:tc>
+                <a:extLst>
+                  <a:ext uri="{0D108BD9-81ED-4DB2-BD59-A6C34878D82A}">
+                    <a16:rowId xmlns:a16="http://schemas.microsoft.com/office/drawing/2014/main" val="10000"/>
+                  </a:ext>
+                </a:extLst>
               </a:tr>
               <a:tr h="562707">
                 <a:tc>
@@ -15799,6 +15981,11 @@
                   </a:txBody>
                   <a:tcPr/>
                 </a:tc>
+                <a:extLst>
+                  <a:ext uri="{0D108BD9-81ED-4DB2-BD59-A6C34878D82A}">
+                    <a16:rowId xmlns:a16="http://schemas.microsoft.com/office/drawing/2014/main" val="10001"/>
+                  </a:ext>
+                </a:extLst>
               </a:tr>
               <a:tr h="562707">
                 <a:tc>
@@ -15846,6 +16033,11 @@
                   </a:txBody>
                   <a:tcPr/>
                 </a:tc>
+                <a:extLst>
+                  <a:ext uri="{0D108BD9-81ED-4DB2-BD59-A6C34878D82A}">
+                    <a16:rowId xmlns:a16="http://schemas.microsoft.com/office/drawing/2014/main" val="10002"/>
+                  </a:ext>
+                </a:extLst>
               </a:tr>
               <a:tr h="562707">
                 <a:tc>
@@ -15893,6 +16085,11 @@
                   </a:txBody>
                   <a:tcPr/>
                 </a:tc>
+                <a:extLst>
+                  <a:ext uri="{0D108BD9-81ED-4DB2-BD59-A6C34878D82A}">
+                    <a16:rowId xmlns:a16="http://schemas.microsoft.com/office/drawing/2014/main" val="10003"/>
+                  </a:ext>
+                </a:extLst>
               </a:tr>
               <a:tr h="562707">
                 <a:tc>
@@ -15940,6 +16137,11 @@
                   </a:txBody>
                   <a:tcPr/>
                 </a:tc>
+                <a:extLst>
+                  <a:ext uri="{0D108BD9-81ED-4DB2-BD59-A6C34878D82A}">
+                    <a16:rowId xmlns:a16="http://schemas.microsoft.com/office/drawing/2014/main" val="10004"/>
+                  </a:ext>
+                </a:extLst>
               </a:tr>
             </a:tbl>
           </a:graphicData>
@@ -17156,9 +17358,27 @@
                 <a:tableStyleId>{5C22544A-7EE6-4342-B048-85BDC9FD1C3A}</a:tableStyleId>
               </a:tblPr>
               <a:tblGrid>
-                <a:gridCol w="974621"/>
-                <a:gridCol w="1091245"/>
-                <a:gridCol w="1397955"/>
+                <a:gridCol w="974621">
+                  <a:extLst>
+                    <a:ext uri="{9D8B030D-6E8A-4147-A177-3AD203B41FA5}">
+                      <a16:colId xmlns:a16="http://schemas.microsoft.com/office/drawing/2014/main" val="20000"/>
+                    </a:ext>
+                  </a:extLst>
+                </a:gridCol>
+                <a:gridCol w="1091245">
+                  <a:extLst>
+                    <a:ext uri="{9D8B030D-6E8A-4147-A177-3AD203B41FA5}">
+                      <a16:colId xmlns:a16="http://schemas.microsoft.com/office/drawing/2014/main" val="20001"/>
+                    </a:ext>
+                  </a:extLst>
+                </a:gridCol>
+                <a:gridCol w="1397955">
+                  <a:extLst>
+                    <a:ext uri="{9D8B030D-6E8A-4147-A177-3AD203B41FA5}">
+                      <a16:colId xmlns:a16="http://schemas.microsoft.com/office/drawing/2014/main" val="20002"/>
+                    </a:ext>
+                  </a:extLst>
+                </a:gridCol>
               </a:tblGrid>
               <a:tr h="562707">
                 <a:tc>
@@ -17218,6 +17438,11 @@
                   </a:txBody>
                   <a:tcPr/>
                 </a:tc>
+                <a:extLst>
+                  <a:ext uri="{0D108BD9-81ED-4DB2-BD59-A6C34878D82A}">
+                    <a16:rowId xmlns:a16="http://schemas.microsoft.com/office/drawing/2014/main" val="10000"/>
+                  </a:ext>
+                </a:extLst>
               </a:tr>
               <a:tr h="562707">
                 <a:tc>
@@ -17265,6 +17490,11 @@
                   </a:txBody>
                   <a:tcPr/>
                 </a:tc>
+                <a:extLst>
+                  <a:ext uri="{0D108BD9-81ED-4DB2-BD59-A6C34878D82A}">
+                    <a16:rowId xmlns:a16="http://schemas.microsoft.com/office/drawing/2014/main" val="10001"/>
+                  </a:ext>
+                </a:extLst>
               </a:tr>
               <a:tr h="562707">
                 <a:tc>
@@ -17312,6 +17542,11 @@
                   </a:txBody>
                   <a:tcPr/>
                 </a:tc>
+                <a:extLst>
+                  <a:ext uri="{0D108BD9-81ED-4DB2-BD59-A6C34878D82A}">
+                    <a16:rowId xmlns:a16="http://schemas.microsoft.com/office/drawing/2014/main" val="10002"/>
+                  </a:ext>
+                </a:extLst>
               </a:tr>
               <a:tr h="562707">
                 <a:tc>
@@ -17359,6 +17594,11 @@
                   </a:txBody>
                   <a:tcPr/>
                 </a:tc>
+                <a:extLst>
+                  <a:ext uri="{0D108BD9-81ED-4DB2-BD59-A6C34878D82A}">
+                    <a16:rowId xmlns:a16="http://schemas.microsoft.com/office/drawing/2014/main" val="10003"/>
+                  </a:ext>
+                </a:extLst>
               </a:tr>
               <a:tr h="562707">
                 <a:tc>
@@ -17406,6 +17646,11 @@
                   </a:txBody>
                   <a:tcPr/>
                 </a:tc>
+                <a:extLst>
+                  <a:ext uri="{0D108BD9-81ED-4DB2-BD59-A6C34878D82A}">
+                    <a16:rowId xmlns:a16="http://schemas.microsoft.com/office/drawing/2014/main" val="10004"/>
+                  </a:ext>
+                </a:extLst>
               </a:tr>
             </a:tbl>
           </a:graphicData>
@@ -17744,9 +17989,27 @@
                 <a:tableStyleId>{5C22544A-7EE6-4342-B048-85BDC9FD1C3A}</a:tableStyleId>
               </a:tblPr>
               <a:tblGrid>
-                <a:gridCol w="974621"/>
-                <a:gridCol w="1091245"/>
-                <a:gridCol w="1397955"/>
+                <a:gridCol w="974621">
+                  <a:extLst>
+                    <a:ext uri="{9D8B030D-6E8A-4147-A177-3AD203B41FA5}">
+                      <a16:colId xmlns:a16="http://schemas.microsoft.com/office/drawing/2014/main" val="20000"/>
+                    </a:ext>
+                  </a:extLst>
+                </a:gridCol>
+                <a:gridCol w="1091245">
+                  <a:extLst>
+                    <a:ext uri="{9D8B030D-6E8A-4147-A177-3AD203B41FA5}">
+                      <a16:colId xmlns:a16="http://schemas.microsoft.com/office/drawing/2014/main" val="20001"/>
+                    </a:ext>
+                  </a:extLst>
+                </a:gridCol>
+                <a:gridCol w="1397955">
+                  <a:extLst>
+                    <a:ext uri="{9D8B030D-6E8A-4147-A177-3AD203B41FA5}">
+                      <a16:colId xmlns:a16="http://schemas.microsoft.com/office/drawing/2014/main" val="20002"/>
+                    </a:ext>
+                  </a:extLst>
+                </a:gridCol>
               </a:tblGrid>
               <a:tr h="562707">
                 <a:tc>
@@ -17806,6 +18069,11 @@
                   </a:txBody>
                   <a:tcPr/>
                 </a:tc>
+                <a:extLst>
+                  <a:ext uri="{0D108BD9-81ED-4DB2-BD59-A6C34878D82A}">
+                    <a16:rowId xmlns:a16="http://schemas.microsoft.com/office/drawing/2014/main" val="10000"/>
+                  </a:ext>
+                </a:extLst>
               </a:tr>
               <a:tr h="562707">
                 <a:tc>
@@ -17853,6 +18121,11 @@
                   </a:txBody>
                   <a:tcPr/>
                 </a:tc>
+                <a:extLst>
+                  <a:ext uri="{0D108BD9-81ED-4DB2-BD59-A6C34878D82A}">
+                    <a16:rowId xmlns:a16="http://schemas.microsoft.com/office/drawing/2014/main" val="10001"/>
+                  </a:ext>
+                </a:extLst>
               </a:tr>
               <a:tr h="562707">
                 <a:tc>
@@ -17900,6 +18173,11 @@
                   </a:txBody>
                   <a:tcPr/>
                 </a:tc>
+                <a:extLst>
+                  <a:ext uri="{0D108BD9-81ED-4DB2-BD59-A6C34878D82A}">
+                    <a16:rowId xmlns:a16="http://schemas.microsoft.com/office/drawing/2014/main" val="10002"/>
+                  </a:ext>
+                </a:extLst>
               </a:tr>
               <a:tr h="562707">
                 <a:tc>
@@ -17947,6 +18225,11 @@
                   </a:txBody>
                   <a:tcPr/>
                 </a:tc>
+                <a:extLst>
+                  <a:ext uri="{0D108BD9-81ED-4DB2-BD59-A6C34878D82A}">
+                    <a16:rowId xmlns:a16="http://schemas.microsoft.com/office/drawing/2014/main" val="10003"/>
+                  </a:ext>
+                </a:extLst>
               </a:tr>
               <a:tr h="562707">
                 <a:tc>
@@ -17994,6 +18277,11 @@
                   </a:txBody>
                   <a:tcPr/>
                 </a:tc>
+                <a:extLst>
+                  <a:ext uri="{0D108BD9-81ED-4DB2-BD59-A6C34878D82A}">
+                    <a16:rowId xmlns:a16="http://schemas.microsoft.com/office/drawing/2014/main" val="10004"/>
+                  </a:ext>
+                </a:extLst>
               </a:tr>
             </a:tbl>
           </a:graphicData>
@@ -18332,9 +18620,27 @@
                 <a:tableStyleId>{5C22544A-7EE6-4342-B048-85BDC9FD1C3A}</a:tableStyleId>
               </a:tblPr>
               <a:tblGrid>
-                <a:gridCol w="974621"/>
-                <a:gridCol w="1091245"/>
-                <a:gridCol w="1397955"/>
+                <a:gridCol w="974621">
+                  <a:extLst>
+                    <a:ext uri="{9D8B030D-6E8A-4147-A177-3AD203B41FA5}">
+                      <a16:colId xmlns:a16="http://schemas.microsoft.com/office/drawing/2014/main" val="20000"/>
+                    </a:ext>
+                  </a:extLst>
+                </a:gridCol>
+                <a:gridCol w="1091245">
+                  <a:extLst>
+                    <a:ext uri="{9D8B030D-6E8A-4147-A177-3AD203B41FA5}">
+                      <a16:colId xmlns:a16="http://schemas.microsoft.com/office/drawing/2014/main" val="20001"/>
+                    </a:ext>
+                  </a:extLst>
+                </a:gridCol>
+                <a:gridCol w="1397955">
+                  <a:extLst>
+                    <a:ext uri="{9D8B030D-6E8A-4147-A177-3AD203B41FA5}">
+                      <a16:colId xmlns:a16="http://schemas.microsoft.com/office/drawing/2014/main" val="20002"/>
+                    </a:ext>
+                  </a:extLst>
+                </a:gridCol>
               </a:tblGrid>
               <a:tr h="562707">
                 <a:tc>
@@ -18394,6 +18700,11 @@
                   </a:txBody>
                   <a:tcPr/>
                 </a:tc>
+                <a:extLst>
+                  <a:ext uri="{0D108BD9-81ED-4DB2-BD59-A6C34878D82A}">
+                    <a16:rowId xmlns:a16="http://schemas.microsoft.com/office/drawing/2014/main" val="10000"/>
+                  </a:ext>
+                </a:extLst>
               </a:tr>
               <a:tr h="562707">
                 <a:tc>
@@ -18441,6 +18752,11 @@
                   </a:txBody>
                   <a:tcPr/>
                 </a:tc>
+                <a:extLst>
+                  <a:ext uri="{0D108BD9-81ED-4DB2-BD59-A6C34878D82A}">
+                    <a16:rowId xmlns:a16="http://schemas.microsoft.com/office/drawing/2014/main" val="10001"/>
+                  </a:ext>
+                </a:extLst>
               </a:tr>
               <a:tr h="562707">
                 <a:tc>
@@ -18488,6 +18804,11 @@
                   </a:txBody>
                   <a:tcPr/>
                 </a:tc>
+                <a:extLst>
+                  <a:ext uri="{0D108BD9-81ED-4DB2-BD59-A6C34878D82A}">
+                    <a16:rowId xmlns:a16="http://schemas.microsoft.com/office/drawing/2014/main" val="10002"/>
+                  </a:ext>
+                </a:extLst>
               </a:tr>
               <a:tr h="562707">
                 <a:tc>
@@ -18535,6 +18856,11 @@
                   </a:txBody>
                   <a:tcPr/>
                 </a:tc>
+                <a:extLst>
+                  <a:ext uri="{0D108BD9-81ED-4DB2-BD59-A6C34878D82A}">
+                    <a16:rowId xmlns:a16="http://schemas.microsoft.com/office/drawing/2014/main" val="10003"/>
+                  </a:ext>
+                </a:extLst>
               </a:tr>
               <a:tr h="562707">
                 <a:tc>
@@ -18582,6 +18908,11 @@
                   </a:txBody>
                   <a:tcPr/>
                 </a:tc>
+                <a:extLst>
+                  <a:ext uri="{0D108BD9-81ED-4DB2-BD59-A6C34878D82A}">
+                    <a16:rowId xmlns:a16="http://schemas.microsoft.com/office/drawing/2014/main" val="10004"/>
+                  </a:ext>
+                </a:extLst>
               </a:tr>
             </a:tbl>
           </a:graphicData>
@@ -18794,9 +19125,27 @@
                 <a:tableStyleId>{5C22544A-7EE6-4342-B048-85BDC9FD1C3A}</a:tableStyleId>
               </a:tblPr>
               <a:tblGrid>
-                <a:gridCol w="974621"/>
-                <a:gridCol w="1091245"/>
-                <a:gridCol w="1397955"/>
+                <a:gridCol w="974621">
+                  <a:extLst>
+                    <a:ext uri="{9D8B030D-6E8A-4147-A177-3AD203B41FA5}">
+                      <a16:colId xmlns:a16="http://schemas.microsoft.com/office/drawing/2014/main" val="20000"/>
+                    </a:ext>
+                  </a:extLst>
+                </a:gridCol>
+                <a:gridCol w="1091245">
+                  <a:extLst>
+                    <a:ext uri="{9D8B030D-6E8A-4147-A177-3AD203B41FA5}">
+                      <a16:colId xmlns:a16="http://schemas.microsoft.com/office/drawing/2014/main" val="20001"/>
+                    </a:ext>
+                  </a:extLst>
+                </a:gridCol>
+                <a:gridCol w="1397955">
+                  <a:extLst>
+                    <a:ext uri="{9D8B030D-6E8A-4147-A177-3AD203B41FA5}">
+                      <a16:colId xmlns:a16="http://schemas.microsoft.com/office/drawing/2014/main" val="20002"/>
+                    </a:ext>
+                  </a:extLst>
+                </a:gridCol>
               </a:tblGrid>
               <a:tr h="562707">
                 <a:tc>
@@ -18856,6 +19205,11 @@
                   </a:txBody>
                   <a:tcPr/>
                 </a:tc>
+                <a:extLst>
+                  <a:ext uri="{0D108BD9-81ED-4DB2-BD59-A6C34878D82A}">
+                    <a16:rowId xmlns:a16="http://schemas.microsoft.com/office/drawing/2014/main" val="10000"/>
+                  </a:ext>
+                </a:extLst>
               </a:tr>
               <a:tr h="562707">
                 <a:tc>
@@ -18903,6 +19257,11 @@
                   </a:txBody>
                   <a:tcPr/>
                 </a:tc>
+                <a:extLst>
+                  <a:ext uri="{0D108BD9-81ED-4DB2-BD59-A6C34878D82A}">
+                    <a16:rowId xmlns:a16="http://schemas.microsoft.com/office/drawing/2014/main" val="10001"/>
+                  </a:ext>
+                </a:extLst>
               </a:tr>
               <a:tr h="562707">
                 <a:tc>
@@ -18950,6 +19309,11 @@
                   </a:txBody>
                   <a:tcPr/>
                 </a:tc>
+                <a:extLst>
+                  <a:ext uri="{0D108BD9-81ED-4DB2-BD59-A6C34878D82A}">
+                    <a16:rowId xmlns:a16="http://schemas.microsoft.com/office/drawing/2014/main" val="10002"/>
+                  </a:ext>
+                </a:extLst>
               </a:tr>
               <a:tr h="562707">
                 <a:tc>
@@ -18997,6 +19361,11 @@
                   </a:txBody>
                   <a:tcPr/>
                 </a:tc>
+                <a:extLst>
+                  <a:ext uri="{0D108BD9-81ED-4DB2-BD59-A6C34878D82A}">
+                    <a16:rowId xmlns:a16="http://schemas.microsoft.com/office/drawing/2014/main" val="10003"/>
+                  </a:ext>
+                </a:extLst>
               </a:tr>
               <a:tr h="562707">
                 <a:tc>
@@ -19044,6 +19413,11 @@
                   </a:txBody>
                   <a:tcPr/>
                 </a:tc>
+                <a:extLst>
+                  <a:ext uri="{0D108BD9-81ED-4DB2-BD59-A6C34878D82A}">
+                    <a16:rowId xmlns:a16="http://schemas.microsoft.com/office/drawing/2014/main" val="10004"/>
+                  </a:ext>
+                </a:extLst>
               </a:tr>
             </a:tbl>
           </a:graphicData>

</xml_diff>